<commit_message>
Added assignment paper first draft
</commit_message>
<xml_diff>
--- a/Tool_Resources/drawings.pptx
+++ b/Tool_Resources/drawings.pptx
@@ -9,6 +9,7 @@
     <p:sldId id="257" r:id="rId3"/>
     <p:sldId id="259" r:id="rId4"/>
     <p:sldId id="258" r:id="rId5"/>
+    <p:sldId id="260" r:id="rId6"/>
   </p:sldIdLst>
   <p:sldSz cx="12192000" cy="6858000"/>
   <p:notesSz cx="6858000" cy="9144000"/>
@@ -246,7 +247,7 @@
           <a:p>
             <a:fld id="{29CD8D3B-7919-664C-88D9-0BD9DCF8016B}" type="datetimeFigureOut">
               <a:rPr lang="en-US" smtClean="0"/>
-              <a:t>6/21/16</a:t>
+              <a:t>6/26/16</a:t>
             </a:fld>
             <a:endParaRPr lang="en-US"/>
           </a:p>
@@ -416,7 +417,7 @@
           <a:p>
             <a:fld id="{29CD8D3B-7919-664C-88D9-0BD9DCF8016B}" type="datetimeFigureOut">
               <a:rPr lang="en-US" smtClean="0"/>
-              <a:t>6/21/16</a:t>
+              <a:t>6/26/16</a:t>
             </a:fld>
             <a:endParaRPr lang="en-US"/>
           </a:p>
@@ -596,7 +597,7 @@
           <a:p>
             <a:fld id="{29CD8D3B-7919-664C-88D9-0BD9DCF8016B}" type="datetimeFigureOut">
               <a:rPr lang="en-US" smtClean="0"/>
-              <a:t>6/21/16</a:t>
+              <a:t>6/26/16</a:t>
             </a:fld>
             <a:endParaRPr lang="en-US"/>
           </a:p>
@@ -766,7 +767,7 @@
           <a:p>
             <a:fld id="{29CD8D3B-7919-664C-88D9-0BD9DCF8016B}" type="datetimeFigureOut">
               <a:rPr lang="en-US" smtClean="0"/>
-              <a:t>6/21/16</a:t>
+              <a:t>6/26/16</a:t>
             </a:fld>
             <a:endParaRPr lang="en-US"/>
           </a:p>
@@ -1012,7 +1013,7 @@
           <a:p>
             <a:fld id="{29CD8D3B-7919-664C-88D9-0BD9DCF8016B}" type="datetimeFigureOut">
               <a:rPr lang="en-US" smtClean="0"/>
-              <a:t>6/21/16</a:t>
+              <a:t>6/26/16</a:t>
             </a:fld>
             <a:endParaRPr lang="en-US"/>
           </a:p>
@@ -1244,7 +1245,7 @@
           <a:p>
             <a:fld id="{29CD8D3B-7919-664C-88D9-0BD9DCF8016B}" type="datetimeFigureOut">
               <a:rPr lang="en-US" smtClean="0"/>
-              <a:t>6/21/16</a:t>
+              <a:t>6/26/16</a:t>
             </a:fld>
             <a:endParaRPr lang="en-US"/>
           </a:p>
@@ -1611,7 +1612,7 @@
           <a:p>
             <a:fld id="{29CD8D3B-7919-664C-88D9-0BD9DCF8016B}" type="datetimeFigureOut">
               <a:rPr lang="en-US" smtClean="0"/>
-              <a:t>6/21/16</a:t>
+              <a:t>6/26/16</a:t>
             </a:fld>
             <a:endParaRPr lang="en-US"/>
           </a:p>
@@ -1729,7 +1730,7 @@
           <a:p>
             <a:fld id="{29CD8D3B-7919-664C-88D9-0BD9DCF8016B}" type="datetimeFigureOut">
               <a:rPr lang="en-US" smtClean="0"/>
-              <a:t>6/21/16</a:t>
+              <a:t>6/26/16</a:t>
             </a:fld>
             <a:endParaRPr lang="en-US"/>
           </a:p>
@@ -1824,7 +1825,7 @@
           <a:p>
             <a:fld id="{29CD8D3B-7919-664C-88D9-0BD9DCF8016B}" type="datetimeFigureOut">
               <a:rPr lang="en-US" smtClean="0"/>
-              <a:t>6/21/16</a:t>
+              <a:t>6/26/16</a:t>
             </a:fld>
             <a:endParaRPr lang="en-US"/>
           </a:p>
@@ -2101,7 +2102,7 @@
           <a:p>
             <a:fld id="{29CD8D3B-7919-664C-88D9-0BD9DCF8016B}" type="datetimeFigureOut">
               <a:rPr lang="en-US" smtClean="0"/>
-              <a:t>6/21/16</a:t>
+              <a:t>6/26/16</a:t>
             </a:fld>
             <a:endParaRPr lang="en-US"/>
           </a:p>
@@ -2354,7 +2355,7 @@
           <a:p>
             <a:fld id="{29CD8D3B-7919-664C-88D9-0BD9DCF8016B}" type="datetimeFigureOut">
               <a:rPr lang="en-US" smtClean="0"/>
-              <a:t>6/21/16</a:t>
+              <a:t>6/26/16</a:t>
             </a:fld>
             <a:endParaRPr lang="en-US"/>
           </a:p>
@@ -2567,7 +2568,7 @@
           <a:p>
             <a:fld id="{29CD8D3B-7919-664C-88D9-0BD9DCF8016B}" type="datetimeFigureOut">
               <a:rPr lang="en-US" smtClean="0"/>
-              <a:t>6/21/16</a:t>
+              <a:t>6/26/16</a:t>
             </a:fld>
             <a:endParaRPr lang="en-US"/>
           </a:p>
@@ -5365,6 +5366,74 @@
 </p:sld>
 </file>
 
+<file path=ppt/slides/slide5.xml><?xml version="1.0" encoding="utf-8"?>
+<p:sld xmlns:a="http://schemas.openxmlformats.org/drawingml/2006/main" xmlns:r="http://schemas.openxmlformats.org/officeDocument/2006/relationships" xmlns:p="http://schemas.openxmlformats.org/presentationml/2006/main">
+  <p:cSld>
+    <p:spTree>
+      <p:nvGrpSpPr>
+        <p:cNvPr id="1" name=""/>
+        <p:cNvGrpSpPr/>
+        <p:nvPr/>
+      </p:nvGrpSpPr>
+      <p:grpSpPr>
+        <a:xfrm>
+          <a:off x="0" y="0"/>
+          <a:ext cx="0" cy="0"/>
+          <a:chOff x="0" y="0"/>
+          <a:chExt cx="0" cy="0"/>
+        </a:xfrm>
+      </p:grpSpPr>
+      <p:sp>
+        <p:nvSpPr>
+          <p:cNvPr id="4" name="TextBox 3"/>
+          <p:cNvSpPr txBox="1"/>
+          <p:nvPr/>
+        </p:nvSpPr>
+        <p:spPr>
+          <a:xfrm>
+            <a:off x="3771900" y="1016000"/>
+            <a:ext cx="4064000" cy="2554545"/>
+          </a:xfrm>
+          <a:prstGeom prst="rect">
+            <a:avLst/>
+          </a:prstGeom>
+          <a:noFill/>
+        </p:spPr>
+        <p:txBody>
+          <a:bodyPr wrap="square" rtlCol="0">
+            <a:spAutoFit/>
+          </a:bodyPr>
+          <a:lstStyle/>
+          <a:p>
+            <a:pPr algn="ctr"/>
+            <a:r>
+              <a:rPr lang="en-US" sz="3200" b="1" dirty="0" smtClean="0"/>
+              <a:t>SMOOT</a:t>
+            </a:r>
+          </a:p>
+          <a:p>
+            <a:pPr algn="ctr"/>
+            <a:r>
+              <a:rPr lang="en-US" sz="3200" dirty="0" smtClean="0"/>
+              <a:t>No Pareto front generated for this iteration, run the proposed experiment</a:t>
+            </a:r>
+            <a:endParaRPr lang="en-US" sz="3200" dirty="0"/>
+          </a:p>
+        </p:txBody>
+      </p:sp>
+    </p:spTree>
+    <p:extLst>
+      <p:ext uri="{BB962C8B-B14F-4D97-AF65-F5344CB8AC3E}">
+        <p14:creationId xmlns:p14="http://schemas.microsoft.com/office/powerpoint/2010/main" val="7901241"/>
+      </p:ext>
+    </p:extLst>
+  </p:cSld>
+  <p:clrMapOvr>
+    <a:masterClrMapping/>
+  </p:clrMapOvr>
+</p:sld>
+</file>
+
 <file path=ppt/theme/theme1.xml><?xml version="1.0" encoding="utf-8"?>
 <a:theme xmlns:a="http://schemas.openxmlformats.org/drawingml/2006/main" name="Office Theme">
   <a:themeElements>

</xml_diff>

<commit_message>
waiting for tool approval to continue
</commit_message>
<xml_diff>
--- a/Tool_Resources/drawings.pptx
+++ b/Tool_Resources/drawings.pptx
@@ -6,10 +6,11 @@
   </p:sldMasterIdLst>
   <p:sldIdLst>
     <p:sldId id="256" r:id="rId2"/>
-    <p:sldId id="257" r:id="rId3"/>
-    <p:sldId id="259" r:id="rId4"/>
-    <p:sldId id="258" r:id="rId5"/>
-    <p:sldId id="260" r:id="rId6"/>
+    <p:sldId id="261" r:id="rId3"/>
+    <p:sldId id="257" r:id="rId4"/>
+    <p:sldId id="259" r:id="rId5"/>
+    <p:sldId id="258" r:id="rId6"/>
+    <p:sldId id="260" r:id="rId7"/>
   </p:sldIdLst>
   <p:sldSz cx="12192000" cy="6858000"/>
   <p:notesSz cx="6858000" cy="9144000"/>
@@ -247,7 +248,7 @@
           <a:p>
             <a:fld id="{29CD8D3B-7919-664C-88D9-0BD9DCF8016B}" type="datetimeFigureOut">
               <a:rPr lang="en-US" smtClean="0"/>
-              <a:t>6/26/16</a:t>
+              <a:t>6/29/16</a:t>
             </a:fld>
             <a:endParaRPr lang="en-US"/>
           </a:p>
@@ -417,7 +418,7 @@
           <a:p>
             <a:fld id="{29CD8D3B-7919-664C-88D9-0BD9DCF8016B}" type="datetimeFigureOut">
               <a:rPr lang="en-US" smtClean="0"/>
-              <a:t>6/26/16</a:t>
+              <a:t>6/29/16</a:t>
             </a:fld>
             <a:endParaRPr lang="en-US"/>
           </a:p>
@@ -597,7 +598,7 @@
           <a:p>
             <a:fld id="{29CD8D3B-7919-664C-88D9-0BD9DCF8016B}" type="datetimeFigureOut">
               <a:rPr lang="en-US" smtClean="0"/>
-              <a:t>6/26/16</a:t>
+              <a:t>6/29/16</a:t>
             </a:fld>
             <a:endParaRPr lang="en-US"/>
           </a:p>
@@ -767,7 +768,7 @@
           <a:p>
             <a:fld id="{29CD8D3B-7919-664C-88D9-0BD9DCF8016B}" type="datetimeFigureOut">
               <a:rPr lang="en-US" smtClean="0"/>
-              <a:t>6/26/16</a:t>
+              <a:t>6/29/16</a:t>
             </a:fld>
             <a:endParaRPr lang="en-US"/>
           </a:p>
@@ -1013,7 +1014,7 @@
           <a:p>
             <a:fld id="{29CD8D3B-7919-664C-88D9-0BD9DCF8016B}" type="datetimeFigureOut">
               <a:rPr lang="en-US" smtClean="0"/>
-              <a:t>6/26/16</a:t>
+              <a:t>6/29/16</a:t>
             </a:fld>
             <a:endParaRPr lang="en-US"/>
           </a:p>
@@ -1245,7 +1246,7 @@
           <a:p>
             <a:fld id="{29CD8D3B-7919-664C-88D9-0BD9DCF8016B}" type="datetimeFigureOut">
               <a:rPr lang="en-US" smtClean="0"/>
-              <a:t>6/26/16</a:t>
+              <a:t>6/29/16</a:t>
             </a:fld>
             <a:endParaRPr lang="en-US"/>
           </a:p>
@@ -1612,7 +1613,7 @@
           <a:p>
             <a:fld id="{29CD8D3B-7919-664C-88D9-0BD9DCF8016B}" type="datetimeFigureOut">
               <a:rPr lang="en-US" smtClean="0"/>
-              <a:t>6/26/16</a:t>
+              <a:t>6/29/16</a:t>
             </a:fld>
             <a:endParaRPr lang="en-US"/>
           </a:p>
@@ -1730,7 +1731,7 @@
           <a:p>
             <a:fld id="{29CD8D3B-7919-664C-88D9-0BD9DCF8016B}" type="datetimeFigureOut">
               <a:rPr lang="en-US" smtClean="0"/>
-              <a:t>6/26/16</a:t>
+              <a:t>6/29/16</a:t>
             </a:fld>
             <a:endParaRPr lang="en-US"/>
           </a:p>
@@ -1825,7 +1826,7 @@
           <a:p>
             <a:fld id="{29CD8D3B-7919-664C-88D9-0BD9DCF8016B}" type="datetimeFigureOut">
               <a:rPr lang="en-US" smtClean="0"/>
-              <a:t>6/26/16</a:t>
+              <a:t>6/29/16</a:t>
             </a:fld>
             <a:endParaRPr lang="en-US"/>
           </a:p>
@@ -2102,7 +2103,7 @@
           <a:p>
             <a:fld id="{29CD8D3B-7919-664C-88D9-0BD9DCF8016B}" type="datetimeFigureOut">
               <a:rPr lang="en-US" smtClean="0"/>
-              <a:t>6/26/16</a:t>
+              <a:t>6/29/16</a:t>
             </a:fld>
             <a:endParaRPr lang="en-US"/>
           </a:p>
@@ -2355,7 +2356,7 @@
           <a:p>
             <a:fld id="{29CD8D3B-7919-664C-88D9-0BD9DCF8016B}" type="datetimeFigureOut">
               <a:rPr lang="en-US" smtClean="0"/>
-              <a:t>6/26/16</a:t>
+              <a:t>6/29/16</a:t>
             </a:fld>
             <a:endParaRPr lang="en-US"/>
           </a:p>
@@ -2568,7 +2569,7 @@
           <a:p>
             <a:fld id="{29CD8D3B-7919-664C-88D9-0BD9DCF8016B}" type="datetimeFigureOut">
               <a:rPr lang="en-US" smtClean="0"/>
-              <a:t>6/26/16</a:t>
+              <a:t>6/29/16</a:t>
             </a:fld>
             <a:endParaRPr lang="en-US"/>
           </a:p>
@@ -4317,6 +4318,417 @@
       </p:grpSpPr>
       <p:grpSp>
         <p:nvGrpSpPr>
+          <p:cNvPr id="32" name="Group 31"/>
+          <p:cNvGrpSpPr/>
+          <p:nvPr/>
+        </p:nvGrpSpPr>
+        <p:grpSpPr>
+          <a:xfrm>
+            <a:off x="2291938" y="1520042"/>
+            <a:ext cx="6623462" cy="2149434"/>
+            <a:chOff x="2291938" y="1520042"/>
+            <a:chExt cx="6623462" cy="2149434"/>
+          </a:xfrm>
+        </p:grpSpPr>
+        <p:sp>
+          <p:nvSpPr>
+            <p:cNvPr id="28" name="TextBox 27"/>
+            <p:cNvSpPr txBox="1"/>
+            <p:nvPr/>
+          </p:nvSpPr>
+          <p:spPr>
+            <a:xfrm>
+              <a:off x="7724631" y="2406147"/>
+              <a:ext cx="1190769" cy="646331"/>
+            </a:xfrm>
+            <a:prstGeom prst="rect">
+              <a:avLst/>
+            </a:prstGeom>
+            <a:noFill/>
+          </p:spPr>
+          <p:txBody>
+            <a:bodyPr wrap="square" rtlCol="0">
+              <a:spAutoFit/>
+            </a:bodyPr>
+            <a:lstStyle/>
+            <a:p>
+              <a:r>
+                <a:rPr lang="en-US" dirty="0" smtClean="0">
+                  <a:latin typeface="Times New Roman" charset="0"/>
+                  <a:ea typeface="Times New Roman" charset="0"/>
+                  <a:cs typeface="Times New Roman" charset="0"/>
+                </a:rPr>
+                <a:t>Observed Outputs</a:t>
+              </a:r>
+              <a:endParaRPr lang="en-US" dirty="0">
+                <a:latin typeface="Times New Roman" charset="0"/>
+                <a:ea typeface="Times New Roman" charset="0"/>
+                <a:cs typeface="Times New Roman" charset="0"/>
+              </a:endParaRPr>
+            </a:p>
+          </p:txBody>
+        </p:sp>
+        <p:sp>
+          <p:nvSpPr>
+            <p:cNvPr id="4" name="Cube 3"/>
+            <p:cNvSpPr/>
+            <p:nvPr/>
+          </p:nvSpPr>
+          <p:spPr>
+            <a:xfrm>
+              <a:off x="4025734" y="1520042"/>
+              <a:ext cx="3396343" cy="2149434"/>
+            </a:xfrm>
+            <a:prstGeom prst="cube">
+              <a:avLst/>
+            </a:prstGeom>
+          </p:spPr>
+          <p:style>
+            <a:lnRef idx="1">
+              <a:schemeClr val="accent3"/>
+            </a:lnRef>
+            <a:fillRef idx="2">
+              <a:schemeClr val="accent3"/>
+            </a:fillRef>
+            <a:effectRef idx="1">
+              <a:schemeClr val="accent3"/>
+            </a:effectRef>
+            <a:fontRef idx="minor">
+              <a:schemeClr val="dk1"/>
+            </a:fontRef>
+          </p:style>
+          <p:txBody>
+            <a:bodyPr rtlCol="0" anchor="ctr"/>
+            <a:lstStyle/>
+            <a:p>
+              <a:pPr algn="ctr"/>
+              <a:endParaRPr lang="en-US" sz="4000" dirty="0"/>
+            </a:p>
+          </p:txBody>
+        </p:sp>
+        <p:cxnSp>
+          <p:nvCxnSpPr>
+            <p:cNvPr id="6" name="Straight Arrow Connector 5"/>
+            <p:cNvCxnSpPr/>
+            <p:nvPr/>
+          </p:nvCxnSpPr>
+          <p:spPr>
+            <a:xfrm flipV="1">
+              <a:off x="2291938" y="2137558"/>
+              <a:ext cx="1733796" cy="11876"/>
+            </a:xfrm>
+            <a:prstGeom prst="straightConnector1">
+              <a:avLst/>
+            </a:prstGeom>
+            <a:ln w="38100">
+              <a:solidFill>
+                <a:schemeClr val="tx1"/>
+              </a:solidFill>
+              <a:tailEnd type="triangle"/>
+            </a:ln>
+          </p:spPr>
+          <p:style>
+            <a:lnRef idx="2">
+              <a:schemeClr val="accent1"/>
+            </a:lnRef>
+            <a:fillRef idx="0">
+              <a:schemeClr val="accent1"/>
+            </a:fillRef>
+            <a:effectRef idx="1">
+              <a:schemeClr val="accent1"/>
+            </a:effectRef>
+            <a:fontRef idx="minor">
+              <a:schemeClr val="tx1"/>
+            </a:fontRef>
+          </p:style>
+        </p:cxnSp>
+        <p:cxnSp>
+          <p:nvCxnSpPr>
+            <p:cNvPr id="7" name="Straight Arrow Connector 6"/>
+            <p:cNvCxnSpPr/>
+            <p:nvPr/>
+          </p:nvCxnSpPr>
+          <p:spPr>
+            <a:xfrm flipV="1">
+              <a:off x="2291938" y="3332946"/>
+              <a:ext cx="1733796" cy="11876"/>
+            </a:xfrm>
+            <a:prstGeom prst="straightConnector1">
+              <a:avLst/>
+            </a:prstGeom>
+            <a:ln w="38100">
+              <a:solidFill>
+                <a:schemeClr val="tx1"/>
+              </a:solidFill>
+              <a:tailEnd type="triangle"/>
+            </a:ln>
+          </p:spPr>
+          <p:style>
+            <a:lnRef idx="2">
+              <a:schemeClr val="accent1"/>
+            </a:lnRef>
+            <a:fillRef idx="0">
+              <a:schemeClr val="accent1"/>
+            </a:fillRef>
+            <a:effectRef idx="1">
+              <a:schemeClr val="accent1"/>
+            </a:effectRef>
+            <a:fontRef idx="minor">
+              <a:schemeClr val="tx1"/>
+            </a:fontRef>
+          </p:style>
+        </p:cxnSp>
+        <p:cxnSp>
+          <p:nvCxnSpPr>
+            <p:cNvPr id="8" name="Straight Arrow Connector 7"/>
+            <p:cNvCxnSpPr/>
+            <p:nvPr/>
+          </p:nvCxnSpPr>
+          <p:spPr>
+            <a:xfrm flipV="1">
+              <a:off x="7030625" y="2125682"/>
+              <a:ext cx="1733796" cy="11876"/>
+            </a:xfrm>
+            <a:prstGeom prst="straightConnector1">
+              <a:avLst/>
+            </a:prstGeom>
+            <a:ln w="38100">
+              <a:solidFill>
+                <a:schemeClr val="tx1"/>
+              </a:solidFill>
+              <a:tailEnd type="triangle"/>
+            </a:ln>
+          </p:spPr>
+          <p:style>
+            <a:lnRef idx="2">
+              <a:schemeClr val="accent1"/>
+            </a:lnRef>
+            <a:fillRef idx="0">
+              <a:schemeClr val="accent1"/>
+            </a:fillRef>
+            <a:effectRef idx="1">
+              <a:schemeClr val="accent1"/>
+            </a:effectRef>
+            <a:fontRef idx="minor">
+              <a:schemeClr val="tx1"/>
+            </a:fontRef>
+          </p:style>
+        </p:cxnSp>
+        <p:cxnSp>
+          <p:nvCxnSpPr>
+            <p:cNvPr id="9" name="Straight Arrow Connector 8"/>
+            <p:cNvCxnSpPr/>
+            <p:nvPr/>
+          </p:nvCxnSpPr>
+          <p:spPr>
+            <a:xfrm flipV="1">
+              <a:off x="7030625" y="3321070"/>
+              <a:ext cx="1733796" cy="11876"/>
+            </a:xfrm>
+            <a:prstGeom prst="straightConnector1">
+              <a:avLst/>
+            </a:prstGeom>
+            <a:ln w="38100">
+              <a:solidFill>
+                <a:schemeClr val="tx1"/>
+              </a:solidFill>
+              <a:tailEnd type="triangle"/>
+            </a:ln>
+          </p:spPr>
+          <p:style>
+            <a:lnRef idx="2">
+              <a:schemeClr val="accent1"/>
+            </a:lnRef>
+            <a:fillRef idx="0">
+              <a:schemeClr val="accent1"/>
+            </a:fillRef>
+            <a:effectRef idx="1">
+              <a:schemeClr val="accent1"/>
+            </a:effectRef>
+            <a:fontRef idx="minor">
+              <a:schemeClr val="tx1"/>
+            </a:fontRef>
+          </p:style>
+        </p:cxnSp>
+        <p:pic>
+          <p:nvPicPr>
+            <p:cNvPr id="2" name="Picture 1"/>
+            <p:cNvPicPr>
+              <a:picLocks noChangeAspect="1"/>
+            </p:cNvPicPr>
+            <p:nvPr/>
+          </p:nvPicPr>
+          <p:blipFill>
+            <a:blip r:embed="rId2"/>
+            <a:stretch>
+              <a:fillRect/>
+            </a:stretch>
+          </p:blipFill>
+          <p:spPr>
+            <a:xfrm>
+              <a:off x="5279322" y="2284729"/>
+              <a:ext cx="889165" cy="889165"/>
+            </a:xfrm>
+            <a:prstGeom prst="rect">
+              <a:avLst/>
+            </a:prstGeom>
+          </p:spPr>
+        </p:pic>
+        <p:sp>
+          <p:nvSpPr>
+            <p:cNvPr id="3" name="TextBox 2"/>
+            <p:cNvSpPr txBox="1"/>
+            <p:nvPr/>
+          </p:nvSpPr>
+          <p:spPr>
+            <a:xfrm>
+              <a:off x="2406782" y="2173068"/>
+              <a:ext cx="1226386" cy="646331"/>
+            </a:xfrm>
+            <a:prstGeom prst="rect">
+              <a:avLst/>
+            </a:prstGeom>
+            <a:noFill/>
+          </p:spPr>
+          <p:txBody>
+            <a:bodyPr wrap="square" rtlCol="0">
+              <a:spAutoFit/>
+            </a:bodyPr>
+            <a:lstStyle/>
+            <a:p>
+              <a:r>
+                <a:rPr lang="en-US" dirty="0" smtClean="0">
+                  <a:latin typeface="Times New Roman" charset="0"/>
+                  <a:ea typeface="Times New Roman" charset="0"/>
+                  <a:cs typeface="Times New Roman" charset="0"/>
+                </a:rPr>
+                <a:t>Observed Inputs</a:t>
+              </a:r>
+              <a:endParaRPr lang="en-US" dirty="0">
+                <a:latin typeface="Times New Roman" charset="0"/>
+                <a:ea typeface="Times New Roman" charset="0"/>
+                <a:cs typeface="Times New Roman" charset="0"/>
+              </a:endParaRPr>
+            </a:p>
+          </p:txBody>
+        </p:sp>
+        <p:sp>
+          <p:nvSpPr>
+            <p:cNvPr id="26" name="TextBox 25"/>
+            <p:cNvSpPr txBox="1"/>
+            <p:nvPr/>
+          </p:nvSpPr>
+          <p:spPr>
+            <a:xfrm>
+              <a:off x="2565930" y="2915066"/>
+              <a:ext cx="912042" cy="369332"/>
+            </a:xfrm>
+            <a:prstGeom prst="rect">
+              <a:avLst/>
+            </a:prstGeom>
+            <a:noFill/>
+          </p:spPr>
+          <p:txBody>
+            <a:bodyPr wrap="square" rtlCol="0">
+              <a:spAutoFit/>
+            </a:bodyPr>
+            <a:lstStyle/>
+            <a:p>
+              <a:r>
+                <a:rPr lang="en-US" smtClean="0">
+                  <a:latin typeface="Times New Roman" charset="0"/>
+                  <a:ea typeface="Times New Roman" charset="0"/>
+                  <a:cs typeface="Times New Roman" charset="0"/>
+                </a:rPr>
+                <a:t>Bounds</a:t>
+              </a:r>
+              <a:endParaRPr lang="en-US" dirty="0">
+                <a:latin typeface="Times New Roman" charset="0"/>
+                <a:ea typeface="Times New Roman" charset="0"/>
+                <a:cs typeface="Times New Roman" charset="0"/>
+              </a:endParaRPr>
+            </a:p>
+          </p:txBody>
+        </p:sp>
+        <p:sp>
+          <p:nvSpPr>
+            <p:cNvPr id="29" name="TextBox 28"/>
+            <p:cNvSpPr txBox="1"/>
+            <p:nvPr/>
+          </p:nvSpPr>
+          <p:spPr>
+            <a:xfrm>
+              <a:off x="4141198" y="2406145"/>
+              <a:ext cx="1304608" cy="646331"/>
+            </a:xfrm>
+            <a:prstGeom prst="rect">
+              <a:avLst/>
+            </a:prstGeom>
+            <a:noFill/>
+          </p:spPr>
+          <p:txBody>
+            <a:bodyPr wrap="square" rtlCol="0">
+              <a:spAutoFit/>
+            </a:bodyPr>
+            <a:lstStyle/>
+            <a:p>
+              <a:r>
+                <a:rPr lang="en-US" dirty="0" smtClean="0">
+                  <a:latin typeface="Times New Roman" charset="0"/>
+                  <a:ea typeface="Times New Roman" charset="0"/>
+                  <a:cs typeface="Times New Roman" charset="0"/>
+                </a:rPr>
+                <a:t>Number </a:t>
+              </a:r>
+              <a:r>
+                <a:rPr lang="en-US" smtClean="0">
+                  <a:latin typeface="Times New Roman" charset="0"/>
+                  <a:ea typeface="Times New Roman" charset="0"/>
+                  <a:cs typeface="Times New Roman" charset="0"/>
+                </a:rPr>
+                <a:t>of Iterations</a:t>
+              </a:r>
+              <a:endParaRPr lang="en-US" dirty="0">
+                <a:latin typeface="Times New Roman" charset="0"/>
+                <a:ea typeface="Times New Roman" charset="0"/>
+                <a:cs typeface="Times New Roman" charset="0"/>
+              </a:endParaRPr>
+            </a:p>
+          </p:txBody>
+        </p:sp>
+      </p:grpSp>
+    </p:spTree>
+    <p:extLst>
+      <p:ext uri="{BB962C8B-B14F-4D97-AF65-F5344CB8AC3E}">
+        <p14:creationId xmlns:p14="http://schemas.microsoft.com/office/powerpoint/2010/main" val="752732617"/>
+      </p:ext>
+    </p:extLst>
+  </p:cSld>
+  <p:clrMapOvr>
+    <a:masterClrMapping/>
+  </p:clrMapOvr>
+</p:sld>
+</file>
+
+<file path=ppt/slides/slide3.xml><?xml version="1.0" encoding="utf-8"?>
+<p:sld xmlns:a="http://schemas.openxmlformats.org/drawingml/2006/main" xmlns:r="http://schemas.openxmlformats.org/officeDocument/2006/relationships" xmlns:p="http://schemas.openxmlformats.org/presentationml/2006/main">
+  <p:cSld>
+    <p:spTree>
+      <p:nvGrpSpPr>
+        <p:cNvPr id="1" name=""/>
+        <p:cNvGrpSpPr/>
+        <p:nvPr/>
+      </p:nvGrpSpPr>
+      <p:grpSpPr>
+        <a:xfrm>
+          <a:off x="0" y="0"/>
+          <a:ext cx="0" cy="0"/>
+          <a:chOff x="0" y="0"/>
+          <a:chExt cx="0" cy="0"/>
+        </a:xfrm>
+      </p:grpSpPr>
+      <p:grpSp>
+        <p:nvGrpSpPr>
           <p:cNvPr id="47" name="Group 46"/>
           <p:cNvGrpSpPr/>
           <p:nvPr/>
@@ -4650,7 +5062,7 @@
 </p:sld>
 </file>
 
-<file path=ppt/slides/slide3.xml><?xml version="1.0" encoding="utf-8"?>
+<file path=ppt/slides/slide4.xml><?xml version="1.0" encoding="utf-8"?>
 <p:sld xmlns:a="http://schemas.openxmlformats.org/drawingml/2006/main" xmlns:r="http://schemas.openxmlformats.org/officeDocument/2006/relationships" xmlns:p="http://schemas.openxmlformats.org/presentationml/2006/main">
   <p:cSld>
     <p:spTree>
@@ -5008,7 +5420,7 @@
 </p:sld>
 </file>
 
-<file path=ppt/slides/slide4.xml><?xml version="1.0" encoding="utf-8"?>
+<file path=ppt/slides/slide5.xml><?xml version="1.0" encoding="utf-8"?>
 <p:sld xmlns:a="http://schemas.openxmlformats.org/drawingml/2006/main" xmlns:r="http://schemas.openxmlformats.org/officeDocument/2006/relationships" xmlns:p="http://schemas.openxmlformats.org/presentationml/2006/main">
   <p:cSld>
     <p:spTree>
@@ -5366,7 +5778,7 @@
 </p:sld>
 </file>
 
-<file path=ppt/slides/slide5.xml><?xml version="1.0" encoding="utf-8"?>
+<file path=ppt/slides/slide6.xml><?xml version="1.0" encoding="utf-8"?>
 <p:sld xmlns:a="http://schemas.openxmlformats.org/drawingml/2006/main" xmlns:r="http://schemas.openxmlformats.org/officeDocument/2006/relationships" xmlns:p="http://schemas.openxmlformats.org/presentationml/2006/main">
   <p:cSld>
     <p:spTree>

</xml_diff>

<commit_message>
added version 18 of tool
</commit_message>
<xml_diff>
--- a/Tool_Resources/drawings.pptx
+++ b/Tool_Resources/drawings.pptx
@@ -248,7 +248,7 @@
           <a:p>
             <a:fld id="{29CD8D3B-7919-664C-88D9-0BD9DCF8016B}" type="datetimeFigureOut">
               <a:rPr lang="en-US" smtClean="0"/>
-              <a:t>6/29/16</a:t>
+              <a:t>7/1/16</a:t>
             </a:fld>
             <a:endParaRPr lang="en-US"/>
           </a:p>
@@ -418,7 +418,7 @@
           <a:p>
             <a:fld id="{29CD8D3B-7919-664C-88D9-0BD9DCF8016B}" type="datetimeFigureOut">
               <a:rPr lang="en-US" smtClean="0"/>
-              <a:t>6/29/16</a:t>
+              <a:t>7/1/16</a:t>
             </a:fld>
             <a:endParaRPr lang="en-US"/>
           </a:p>
@@ -598,7 +598,7 @@
           <a:p>
             <a:fld id="{29CD8D3B-7919-664C-88D9-0BD9DCF8016B}" type="datetimeFigureOut">
               <a:rPr lang="en-US" smtClean="0"/>
-              <a:t>6/29/16</a:t>
+              <a:t>7/1/16</a:t>
             </a:fld>
             <a:endParaRPr lang="en-US"/>
           </a:p>
@@ -768,7 +768,7 @@
           <a:p>
             <a:fld id="{29CD8D3B-7919-664C-88D9-0BD9DCF8016B}" type="datetimeFigureOut">
               <a:rPr lang="en-US" smtClean="0"/>
-              <a:t>6/29/16</a:t>
+              <a:t>7/1/16</a:t>
             </a:fld>
             <a:endParaRPr lang="en-US"/>
           </a:p>
@@ -1014,7 +1014,7 @@
           <a:p>
             <a:fld id="{29CD8D3B-7919-664C-88D9-0BD9DCF8016B}" type="datetimeFigureOut">
               <a:rPr lang="en-US" smtClean="0"/>
-              <a:t>6/29/16</a:t>
+              <a:t>7/1/16</a:t>
             </a:fld>
             <a:endParaRPr lang="en-US"/>
           </a:p>
@@ -1246,7 +1246,7 @@
           <a:p>
             <a:fld id="{29CD8D3B-7919-664C-88D9-0BD9DCF8016B}" type="datetimeFigureOut">
               <a:rPr lang="en-US" smtClean="0"/>
-              <a:t>6/29/16</a:t>
+              <a:t>7/1/16</a:t>
             </a:fld>
             <a:endParaRPr lang="en-US"/>
           </a:p>
@@ -1613,7 +1613,7 @@
           <a:p>
             <a:fld id="{29CD8D3B-7919-664C-88D9-0BD9DCF8016B}" type="datetimeFigureOut">
               <a:rPr lang="en-US" smtClean="0"/>
-              <a:t>6/29/16</a:t>
+              <a:t>7/1/16</a:t>
             </a:fld>
             <a:endParaRPr lang="en-US"/>
           </a:p>
@@ -1731,7 +1731,7 @@
           <a:p>
             <a:fld id="{29CD8D3B-7919-664C-88D9-0BD9DCF8016B}" type="datetimeFigureOut">
               <a:rPr lang="en-US" smtClean="0"/>
-              <a:t>6/29/16</a:t>
+              <a:t>7/1/16</a:t>
             </a:fld>
             <a:endParaRPr lang="en-US"/>
           </a:p>
@@ -1826,7 +1826,7 @@
           <a:p>
             <a:fld id="{29CD8D3B-7919-664C-88D9-0BD9DCF8016B}" type="datetimeFigureOut">
               <a:rPr lang="en-US" smtClean="0"/>
-              <a:t>6/29/16</a:t>
+              <a:t>7/1/16</a:t>
             </a:fld>
             <a:endParaRPr lang="en-US"/>
           </a:p>
@@ -2103,7 +2103,7 @@
           <a:p>
             <a:fld id="{29CD8D3B-7919-664C-88D9-0BD9DCF8016B}" type="datetimeFigureOut">
               <a:rPr lang="en-US" smtClean="0"/>
-              <a:t>6/29/16</a:t>
+              <a:t>7/1/16</a:t>
             </a:fld>
             <a:endParaRPr lang="en-US"/>
           </a:p>
@@ -2356,7 +2356,7 @@
           <a:p>
             <a:fld id="{29CD8D3B-7919-664C-88D9-0BD9DCF8016B}" type="datetimeFigureOut">
               <a:rPr lang="en-US" smtClean="0"/>
-              <a:t>6/29/16</a:t>
+              <a:t>7/1/16</a:t>
             </a:fld>
             <a:endParaRPr lang="en-US"/>
           </a:p>
@@ -2569,7 +2569,7 @@
           <a:p>
             <a:fld id="{29CD8D3B-7919-664C-88D9-0BD9DCF8016B}" type="datetimeFigureOut">
               <a:rPr lang="en-US" smtClean="0"/>
-              <a:t>6/29/16</a:t>
+              <a:t>7/1/16</a:t>
             </a:fld>
             <a:endParaRPr lang="en-US"/>
           </a:p>
@@ -5833,6 +5833,37 @@
           </a:p>
         </p:txBody>
       </p:sp>
+      <p:sp>
+        <p:nvSpPr>
+          <p:cNvPr id="3" name="TextBox 2"/>
+          <p:cNvSpPr txBox="1"/>
+          <p:nvPr/>
+        </p:nvSpPr>
+        <p:spPr>
+          <a:xfrm>
+            <a:off x="1879600" y="4664590"/>
+            <a:ext cx="4572000" cy="584775"/>
+          </a:xfrm>
+          <a:prstGeom prst="rect">
+            <a:avLst/>
+          </a:prstGeom>
+          <a:noFill/>
+        </p:spPr>
+        <p:txBody>
+          <a:bodyPr wrap="square" rtlCol="0">
+            <a:spAutoFit/>
+          </a:bodyPr>
+          <a:lstStyle/>
+          <a:p>
+            <a:pPr algn="ctr"/>
+            <a:r>
+              <a:rPr lang="en-US" sz="3200" smtClean="0"/>
+              <a:t>New Observed Value:</a:t>
+            </a:r>
+            <a:endParaRPr lang="en-US" sz="3200" dirty="0" smtClean="0"/>
+          </a:p>
+        </p:txBody>
+      </p:sp>
     </p:spTree>
     <p:extLst>
       <p:ext uri="{BB962C8B-B14F-4D97-AF65-F5344CB8AC3E}">

</xml_diff>

<commit_message>
Added poster and deleted unused directory
</commit_message>
<xml_diff>
--- a/Tool_Resources/drawings.pptx
+++ b/Tool_Resources/drawings.pptx
@@ -248,7 +248,7 @@
           <a:p>
             <a:fld id="{29CD8D3B-7919-664C-88D9-0BD9DCF8016B}" type="datetimeFigureOut">
               <a:rPr lang="en-US" smtClean="0"/>
-              <a:t>7/11/16</a:t>
+              <a:t>7/12/16</a:t>
             </a:fld>
             <a:endParaRPr lang="en-US"/>
           </a:p>
@@ -418,7 +418,7 @@
           <a:p>
             <a:fld id="{29CD8D3B-7919-664C-88D9-0BD9DCF8016B}" type="datetimeFigureOut">
               <a:rPr lang="en-US" smtClean="0"/>
-              <a:t>7/11/16</a:t>
+              <a:t>7/12/16</a:t>
             </a:fld>
             <a:endParaRPr lang="en-US"/>
           </a:p>
@@ -598,7 +598,7 @@
           <a:p>
             <a:fld id="{29CD8D3B-7919-664C-88D9-0BD9DCF8016B}" type="datetimeFigureOut">
               <a:rPr lang="en-US" smtClean="0"/>
-              <a:t>7/11/16</a:t>
+              <a:t>7/12/16</a:t>
             </a:fld>
             <a:endParaRPr lang="en-US"/>
           </a:p>
@@ -768,7 +768,7 @@
           <a:p>
             <a:fld id="{29CD8D3B-7919-664C-88D9-0BD9DCF8016B}" type="datetimeFigureOut">
               <a:rPr lang="en-US" smtClean="0"/>
-              <a:t>7/11/16</a:t>
+              <a:t>7/12/16</a:t>
             </a:fld>
             <a:endParaRPr lang="en-US"/>
           </a:p>
@@ -1014,7 +1014,7 @@
           <a:p>
             <a:fld id="{29CD8D3B-7919-664C-88D9-0BD9DCF8016B}" type="datetimeFigureOut">
               <a:rPr lang="en-US" smtClean="0"/>
-              <a:t>7/11/16</a:t>
+              <a:t>7/12/16</a:t>
             </a:fld>
             <a:endParaRPr lang="en-US"/>
           </a:p>
@@ -1246,7 +1246,7 @@
           <a:p>
             <a:fld id="{29CD8D3B-7919-664C-88D9-0BD9DCF8016B}" type="datetimeFigureOut">
               <a:rPr lang="en-US" smtClean="0"/>
-              <a:t>7/11/16</a:t>
+              <a:t>7/12/16</a:t>
             </a:fld>
             <a:endParaRPr lang="en-US"/>
           </a:p>
@@ -1613,7 +1613,7 @@
           <a:p>
             <a:fld id="{29CD8D3B-7919-664C-88D9-0BD9DCF8016B}" type="datetimeFigureOut">
               <a:rPr lang="en-US" smtClean="0"/>
-              <a:t>7/11/16</a:t>
+              <a:t>7/12/16</a:t>
             </a:fld>
             <a:endParaRPr lang="en-US"/>
           </a:p>
@@ -1731,7 +1731,7 @@
           <a:p>
             <a:fld id="{29CD8D3B-7919-664C-88D9-0BD9DCF8016B}" type="datetimeFigureOut">
               <a:rPr lang="en-US" smtClean="0"/>
-              <a:t>7/11/16</a:t>
+              <a:t>7/12/16</a:t>
             </a:fld>
             <a:endParaRPr lang="en-US"/>
           </a:p>
@@ -1826,7 +1826,7 @@
           <a:p>
             <a:fld id="{29CD8D3B-7919-664C-88D9-0BD9DCF8016B}" type="datetimeFigureOut">
               <a:rPr lang="en-US" smtClean="0"/>
-              <a:t>7/11/16</a:t>
+              <a:t>7/12/16</a:t>
             </a:fld>
             <a:endParaRPr lang="en-US"/>
           </a:p>
@@ -2103,7 +2103,7 @@
           <a:p>
             <a:fld id="{29CD8D3B-7919-664C-88D9-0BD9DCF8016B}" type="datetimeFigureOut">
               <a:rPr lang="en-US" smtClean="0"/>
-              <a:t>7/11/16</a:t>
+              <a:t>7/12/16</a:t>
             </a:fld>
             <a:endParaRPr lang="en-US"/>
           </a:p>
@@ -2356,7 +2356,7 @@
           <a:p>
             <a:fld id="{29CD8D3B-7919-664C-88D9-0BD9DCF8016B}" type="datetimeFigureOut">
               <a:rPr lang="en-US" smtClean="0"/>
-              <a:t>7/11/16</a:t>
+              <a:t>7/12/16</a:t>
             </a:fld>
             <a:endParaRPr lang="en-US"/>
           </a:p>
@@ -2569,7 +2569,7 @@
           <a:p>
             <a:fld id="{29CD8D3B-7919-664C-88D9-0BD9DCF8016B}" type="datetimeFigureOut">
               <a:rPr lang="en-US" smtClean="0"/>
-              <a:t>7/11/16</a:t>
+              <a:t>7/12/16</a:t>
             </a:fld>
             <a:endParaRPr lang="en-US"/>
           </a:p>
@@ -5804,7 +5804,7 @@
         <p:spPr>
           <a:xfrm>
             <a:off x="3771900" y="1016000"/>
-            <a:ext cx="4064000" cy="2554545"/>
+            <a:ext cx="4064000" cy="1569660"/>
           </a:xfrm>
           <a:prstGeom prst="rect">
             <a:avLst/>
@@ -5827,7 +5827,11 @@
             <a:pPr algn="ctr"/>
             <a:r>
               <a:rPr lang="en-US" sz="3200" dirty="0" smtClean="0"/>
-              <a:t>No Pareto front generated for this iteration, run the proposed experiment</a:t>
+              <a:t>No Pareto front </a:t>
+            </a:r>
+            <a:r>
+              <a:rPr lang="en-US" sz="3200" dirty="0" smtClean="0"/>
+              <a:t>available</a:t>
             </a:r>
             <a:endParaRPr lang="en-US" sz="3200" dirty="0"/>
           </a:p>

</xml_diff>